<commit_message>
create new slide 2
</commit_message>
<xml_diff>
--- a/fail three.pptx
+++ b/fail three.pptx
@@ -6,6 +6,7 @@
   </p:sldMasterIdLst>
   <p:sldIdLst>
     <p:sldId id="256" r:id="rId2"/>
+    <p:sldId id="257" r:id="rId3"/>
   </p:sldIdLst>
   <p:sldSz cx="9144000" cy="6858000" type="screen4x3"/>
   <p:notesSz cx="6858000" cy="9144000"/>
@@ -3086,6 +3087,69 @@
           </p:cNvSpPr>
           <p:nvPr>
             <p:ph type="subTitle" idx="1"/>
+          </p:nvPr>
+        </p:nvSpPr>
+        <p:spPr/>
+        <p:txBody>
+          <a:bodyPr/>
+          <a:lstStyle/>
+          <a:p>
+            <a:endParaRPr lang="ru-RU"/>
+          </a:p>
+        </p:txBody>
+      </p:sp>
+    </p:spTree>
+  </p:cSld>
+  <p:clrMapOvr>
+    <a:masterClrMapping/>
+  </p:clrMapOvr>
+</p:sld>
+</file>
+
+<file path=ppt/slides/slide2.xml><?xml version="1.0" encoding="utf-8"?>
+<p:sld xmlns:a="http://schemas.openxmlformats.org/drawingml/2006/main" xmlns:r="http://schemas.openxmlformats.org/officeDocument/2006/relationships" xmlns:p="http://schemas.openxmlformats.org/presentationml/2006/main">
+  <p:cSld>
+    <p:spTree>
+      <p:nvGrpSpPr>
+        <p:cNvPr id="1" name=""/>
+        <p:cNvGrpSpPr/>
+        <p:nvPr/>
+      </p:nvGrpSpPr>
+      <p:grpSpPr>
+        <a:xfrm>
+          <a:off x="0" y="0"/>
+          <a:ext cx="0" cy="0"/>
+          <a:chOff x="0" y="0"/>
+          <a:chExt cx="0" cy="0"/>
+        </a:xfrm>
+      </p:grpSpPr>
+      <p:sp>
+        <p:nvSpPr>
+          <p:cNvPr id="2" name="Заголовок 1"/>
+          <p:cNvSpPr>
+            <a:spLocks noGrp="1"/>
+          </p:cNvSpPr>
+          <p:nvPr>
+            <p:ph type="title"/>
+          </p:nvPr>
+        </p:nvSpPr>
+        <p:spPr/>
+        <p:txBody>
+          <a:bodyPr/>
+          <a:lstStyle/>
+          <a:p>
+            <a:endParaRPr lang="ru-RU"/>
+          </a:p>
+        </p:txBody>
+      </p:sp>
+      <p:sp>
+        <p:nvSpPr>
+          <p:cNvPr id="3" name="Содержимое 2"/>
+          <p:cNvSpPr>
+            <a:spLocks noGrp="1"/>
+          </p:cNvSpPr>
+          <p:nvPr>
+            <p:ph idx="1"/>
           </p:nvPr>
         </p:nvSpPr>
         <p:spPr/>

</xml_diff>

<commit_message>
create new slide 3
</commit_message>
<xml_diff>
--- a/fail three.pptx
+++ b/fail three.pptx
@@ -7,6 +7,7 @@
   <p:sldIdLst>
     <p:sldId id="256" r:id="rId2"/>
     <p:sldId id="257" r:id="rId3"/>
+    <p:sldId id="258" r:id="rId4"/>
   </p:sldIdLst>
   <p:sldSz cx="9144000" cy="6858000" type="screen4x3"/>
   <p:notesSz cx="6858000" cy="9144000"/>
@@ -3107,6 +3108,69 @@
 </file>
 
 <file path=ppt/slides/slide2.xml><?xml version="1.0" encoding="utf-8"?>
+<p:sld xmlns:a="http://schemas.openxmlformats.org/drawingml/2006/main" xmlns:r="http://schemas.openxmlformats.org/officeDocument/2006/relationships" xmlns:p="http://schemas.openxmlformats.org/presentationml/2006/main">
+  <p:cSld>
+    <p:spTree>
+      <p:nvGrpSpPr>
+        <p:cNvPr id="1" name=""/>
+        <p:cNvGrpSpPr/>
+        <p:nvPr/>
+      </p:nvGrpSpPr>
+      <p:grpSpPr>
+        <a:xfrm>
+          <a:off x="0" y="0"/>
+          <a:ext cx="0" cy="0"/>
+          <a:chOff x="0" y="0"/>
+          <a:chExt cx="0" cy="0"/>
+        </a:xfrm>
+      </p:grpSpPr>
+      <p:sp>
+        <p:nvSpPr>
+          <p:cNvPr id="2" name="Заголовок 1"/>
+          <p:cNvSpPr>
+            <a:spLocks noGrp="1"/>
+          </p:cNvSpPr>
+          <p:nvPr>
+            <p:ph type="title"/>
+          </p:nvPr>
+        </p:nvSpPr>
+        <p:spPr/>
+        <p:txBody>
+          <a:bodyPr/>
+          <a:lstStyle/>
+          <a:p>
+            <a:endParaRPr lang="ru-RU"/>
+          </a:p>
+        </p:txBody>
+      </p:sp>
+      <p:sp>
+        <p:nvSpPr>
+          <p:cNvPr id="3" name="Содержимое 2"/>
+          <p:cNvSpPr>
+            <a:spLocks noGrp="1"/>
+          </p:cNvSpPr>
+          <p:nvPr>
+            <p:ph idx="1"/>
+          </p:nvPr>
+        </p:nvSpPr>
+        <p:spPr/>
+        <p:txBody>
+          <a:bodyPr/>
+          <a:lstStyle/>
+          <a:p>
+            <a:endParaRPr lang="ru-RU"/>
+          </a:p>
+        </p:txBody>
+      </p:sp>
+    </p:spTree>
+  </p:cSld>
+  <p:clrMapOvr>
+    <a:masterClrMapping/>
+  </p:clrMapOvr>
+</p:sld>
+</file>
+
+<file path=ppt/slides/slide3.xml><?xml version="1.0" encoding="utf-8"?>
 <p:sld xmlns:a="http://schemas.openxmlformats.org/drawingml/2006/main" xmlns:r="http://schemas.openxmlformats.org/officeDocument/2006/relationships" xmlns:p="http://schemas.openxmlformats.org/presentationml/2006/main">
   <p:cSld>
     <p:spTree>

</xml_diff>

<commit_message>
create new slide 4
</commit_message>
<xml_diff>
--- a/fail three.pptx
+++ b/fail three.pptx
@@ -8,6 +8,7 @@
     <p:sldId id="256" r:id="rId2"/>
     <p:sldId id="257" r:id="rId3"/>
     <p:sldId id="258" r:id="rId4"/>
+    <p:sldId id="259" r:id="rId5"/>
   </p:sldIdLst>
   <p:sldSz cx="9144000" cy="6858000" type="screen4x3"/>
   <p:notesSz cx="6858000" cy="9144000"/>
@@ -3171,6 +3172,69 @@
 </file>
 
 <file path=ppt/slides/slide3.xml><?xml version="1.0" encoding="utf-8"?>
+<p:sld xmlns:a="http://schemas.openxmlformats.org/drawingml/2006/main" xmlns:r="http://schemas.openxmlformats.org/officeDocument/2006/relationships" xmlns:p="http://schemas.openxmlformats.org/presentationml/2006/main">
+  <p:cSld>
+    <p:spTree>
+      <p:nvGrpSpPr>
+        <p:cNvPr id="1" name=""/>
+        <p:cNvGrpSpPr/>
+        <p:nvPr/>
+      </p:nvGrpSpPr>
+      <p:grpSpPr>
+        <a:xfrm>
+          <a:off x="0" y="0"/>
+          <a:ext cx="0" cy="0"/>
+          <a:chOff x="0" y="0"/>
+          <a:chExt cx="0" cy="0"/>
+        </a:xfrm>
+      </p:grpSpPr>
+      <p:sp>
+        <p:nvSpPr>
+          <p:cNvPr id="2" name="Заголовок 1"/>
+          <p:cNvSpPr>
+            <a:spLocks noGrp="1"/>
+          </p:cNvSpPr>
+          <p:nvPr>
+            <p:ph type="title"/>
+          </p:nvPr>
+        </p:nvSpPr>
+        <p:spPr/>
+        <p:txBody>
+          <a:bodyPr/>
+          <a:lstStyle/>
+          <a:p>
+            <a:endParaRPr lang="ru-RU"/>
+          </a:p>
+        </p:txBody>
+      </p:sp>
+      <p:sp>
+        <p:nvSpPr>
+          <p:cNvPr id="3" name="Содержимое 2"/>
+          <p:cNvSpPr>
+            <a:spLocks noGrp="1"/>
+          </p:cNvSpPr>
+          <p:nvPr>
+            <p:ph idx="1"/>
+          </p:nvPr>
+        </p:nvSpPr>
+        <p:spPr/>
+        <p:txBody>
+          <a:bodyPr/>
+          <a:lstStyle/>
+          <a:p>
+            <a:endParaRPr lang="ru-RU"/>
+          </a:p>
+        </p:txBody>
+      </p:sp>
+    </p:spTree>
+  </p:cSld>
+  <p:clrMapOvr>
+    <a:masterClrMapping/>
+  </p:clrMapOvr>
+</p:sld>
+</file>
+
+<file path=ppt/slides/slide4.xml><?xml version="1.0" encoding="utf-8"?>
 <p:sld xmlns:a="http://schemas.openxmlformats.org/drawingml/2006/main" xmlns:r="http://schemas.openxmlformats.org/officeDocument/2006/relationships" xmlns:p="http://schemas.openxmlformats.org/presentationml/2006/main">
   <p:cSld>
     <p:spTree>

</xml_diff>